<commit_message>
Add demo links and Touricana email
</commit_message>
<xml_diff>
--- a/Touricana RHH Presentation FINAL.pptx
+++ b/Touricana RHH Presentation FINAL.pptx
@@ -2173,16 +2173,27 @@
           <a:bodyPr/>
           <a:lstStyle/>
           <a:p>
-            <a:pPr marL="0" indent="0">
+            <a:pPr marL="0" indent="0" algn="ctr">
               <a:buNone/>
             </a:pPr>
-            <a:endParaRPr lang="en-US" altLang="en-US" dirty="0" smtClean="0"/>
-          </a:p>
-          <a:p>
-            <a:pPr marL="0" indent="0">
+            <a:r>
+              <a:rPr lang="en-US" sz="1000" dirty="0" smtClean="0"/>
+              <a:t>How can we connect more visitors to a town to</a:t>
+            </a:r>
+          </a:p>
+          <a:p>
+            <a:pPr marL="0" indent="0" algn="ctr">
               <a:buNone/>
             </a:pPr>
-            <a:endParaRPr lang="en-US" altLang="en-US" dirty="0" smtClean="0"/>
+            <a:r>
+              <a:rPr lang="en-US" sz="1000" dirty="0" smtClean="0"/>
+              <a:t>meaningful experiences in that community that will keep them in (and hopefully returning to)</a:t>
+            </a:r>
+            <a:r>
+              <a:rPr lang="en-US" sz="1000" baseline="0" dirty="0" smtClean="0"/>
+              <a:t> that place?</a:t>
+            </a:r>
+            <a:endParaRPr lang="en-US" altLang="en-US" sz="1000" dirty="0" smtClean="0"/>
           </a:p>
           <a:p>
             <a:pPr marL="0" indent="0">

</xml_diff>